<commit_message>
enable scrollX in DT output
</commit_message>
<xml_diff>
--- a/_book/plot/global-organization-country-1.pptx
+++ b/_book/plot/global-organization-country-1.pptx
@@ -4562,7 +4562,7 @@
           </p:nvSpPr>
           <p:spPr>
             <a:xfrm>
-              <a:off x="4779462" y="2842123"/>
+              <a:off x="4779637" y="2851865"/>
               <a:ext cx="296153" cy="102003"/>
             </a:xfrm>
             <a:prstGeom prst="rect">
@@ -4608,7 +4608,7 @@
           </p:nvSpPr>
           <p:spPr>
             <a:xfrm>
-              <a:off x="4579432" y="4272369"/>
+              <a:off x="4581570" y="4269522"/>
               <a:ext cx="482977" cy="128018"/>
             </a:xfrm>
             <a:prstGeom prst="rect">
@@ -4654,7 +4654,7 @@
           </p:nvSpPr>
           <p:spPr>
             <a:xfrm>
-              <a:off x="5638311" y="3544553"/>
+              <a:off x="5636756" y="3546489"/>
               <a:ext cx="966091" cy="102003"/>
             </a:xfrm>
             <a:prstGeom prst="rect">
@@ -4700,7 +4700,7 @@
           </p:nvSpPr>
           <p:spPr>
             <a:xfrm>
-              <a:off x="5621416" y="2851848"/>
+              <a:off x="5621425" y="2850926"/>
               <a:ext cx="989436" cy="103852"/>
             </a:xfrm>
             <a:prstGeom prst="rect">

</xml_diff>